<commit_message>
Show content of Event_Logs if not created the expected number of records
</commit_message>
<xml_diff>
--- a/doc/2021-06_TriXX_OSP.pptx
+++ b/doc/2021-06_TriXX_OSP.pptx
@@ -397,7 +397,7 @@
           <a:p>
             <a:fld id="{65198459-C4F2-C045-9966-EFD31D2DED12}" type="datetime1">
               <a:rPr lang="de-DE" smtClean="0"/>
-              <a:t>09.06.21</a:t>
+              <a:t>23.06.21</a:t>
             </a:fld>
             <a:endParaRPr lang="de-DE"/>
           </a:p>
@@ -563,7 +563,7 @@
           <a:p>
             <a:fld id="{DFE97338-3F22-2E45-8586-98FF6A44F26F}" type="datetime1">
               <a:rPr lang="de-DE" smtClean="0"/>
-              <a:t>09.06.21</a:t>
+              <a:t>23.06.21</a:t>
             </a:fld>
             <a:endParaRPr lang="de-DE"/>
           </a:p>
@@ -28197,16 +28197,15 @@
             </a:r>
             <a:r>
               <a:rPr lang="de-DE" dirty="0"/>
-              <a:t> der Demo:	 https://</a:t>
-            </a:r>
-            <a:r>
-              <a:rPr lang="de-DE" dirty="0" err="1"/>
-              <a:t>bit.ly</a:t>
-            </a:r>
-            <a:r>
-              <a:rPr lang="de-DE" dirty="0"/>
-              <a:t>/3isjpJO</a:t>
-            </a:r>
+              <a:t> der Demo:	 </a:t>
+            </a:r>
+            <a:r>
+              <a:rPr lang="de-DE" dirty="0">
+                <a:hlinkClick r:id="rId2"/>
+              </a:rPr>
+              <a:t>https://bit.ly/3isjpJO</a:t>
+            </a:r>
+            <a:endParaRPr lang="de-DE" dirty="0"/>
           </a:p>
           <a:p>
             <a:endParaRPr lang="de-DE" dirty="0"/>

</xml_diff>